<commit_message>
added server session grpc
</commit_message>
<xml_diff>
--- a/Documents/design/charts.pptx
+++ b/Documents/design/charts.pptx
@@ -259,7 +259,7 @@
           <a:p>
             <a:fld id="{BD674694-9742-45AE-917A-66E650B458D2}" type="datetimeFigureOut">
               <a:rPr lang="zh-CN" altLang="en-US" smtClean="0"/>
-              <a:t>2022-01-24</a:t>
+              <a:t>2022-01-25</a:t>
             </a:fld>
             <a:endParaRPr lang="zh-CN" altLang="en-US"/>
           </a:p>
@@ -457,7 +457,7 @@
           <a:p>
             <a:fld id="{BD674694-9742-45AE-917A-66E650B458D2}" type="datetimeFigureOut">
               <a:rPr lang="zh-CN" altLang="en-US" smtClean="0"/>
-              <a:t>2022-01-24</a:t>
+              <a:t>2022-01-25</a:t>
             </a:fld>
             <a:endParaRPr lang="zh-CN" altLang="en-US"/>
           </a:p>
@@ -665,7 +665,7 @@
           <a:p>
             <a:fld id="{BD674694-9742-45AE-917A-66E650B458D2}" type="datetimeFigureOut">
               <a:rPr lang="zh-CN" altLang="en-US" smtClean="0"/>
-              <a:t>2022-01-24</a:t>
+              <a:t>2022-01-25</a:t>
             </a:fld>
             <a:endParaRPr lang="zh-CN" altLang="en-US"/>
           </a:p>
@@ -863,7 +863,7 @@
           <a:p>
             <a:fld id="{BD674694-9742-45AE-917A-66E650B458D2}" type="datetimeFigureOut">
               <a:rPr lang="zh-CN" altLang="en-US" smtClean="0"/>
-              <a:t>2022-01-24</a:t>
+              <a:t>2022-01-25</a:t>
             </a:fld>
             <a:endParaRPr lang="zh-CN" altLang="en-US"/>
           </a:p>
@@ -1138,7 +1138,7 @@
           <a:p>
             <a:fld id="{BD674694-9742-45AE-917A-66E650B458D2}" type="datetimeFigureOut">
               <a:rPr lang="zh-CN" altLang="en-US" smtClean="0"/>
-              <a:t>2022-01-24</a:t>
+              <a:t>2022-01-25</a:t>
             </a:fld>
             <a:endParaRPr lang="zh-CN" altLang="en-US"/>
           </a:p>
@@ -1403,7 +1403,7 @@
           <a:p>
             <a:fld id="{BD674694-9742-45AE-917A-66E650B458D2}" type="datetimeFigureOut">
               <a:rPr lang="zh-CN" altLang="en-US" smtClean="0"/>
-              <a:t>2022-01-24</a:t>
+              <a:t>2022-01-25</a:t>
             </a:fld>
             <a:endParaRPr lang="zh-CN" altLang="en-US"/>
           </a:p>
@@ -1815,7 +1815,7 @@
           <a:p>
             <a:fld id="{BD674694-9742-45AE-917A-66E650B458D2}" type="datetimeFigureOut">
               <a:rPr lang="zh-CN" altLang="en-US" smtClean="0"/>
-              <a:t>2022-01-24</a:t>
+              <a:t>2022-01-25</a:t>
             </a:fld>
             <a:endParaRPr lang="zh-CN" altLang="en-US"/>
           </a:p>
@@ -1956,7 +1956,7 @@
           <a:p>
             <a:fld id="{BD674694-9742-45AE-917A-66E650B458D2}" type="datetimeFigureOut">
               <a:rPr lang="zh-CN" altLang="en-US" smtClean="0"/>
-              <a:t>2022-01-24</a:t>
+              <a:t>2022-01-25</a:t>
             </a:fld>
             <a:endParaRPr lang="zh-CN" altLang="en-US"/>
           </a:p>
@@ -2069,7 +2069,7 @@
           <a:p>
             <a:fld id="{BD674694-9742-45AE-917A-66E650B458D2}" type="datetimeFigureOut">
               <a:rPr lang="zh-CN" altLang="en-US" smtClean="0"/>
-              <a:t>2022-01-24</a:t>
+              <a:t>2022-01-25</a:t>
             </a:fld>
             <a:endParaRPr lang="zh-CN" altLang="en-US"/>
           </a:p>
@@ -2380,7 +2380,7 @@
           <a:p>
             <a:fld id="{BD674694-9742-45AE-917A-66E650B458D2}" type="datetimeFigureOut">
               <a:rPr lang="zh-CN" altLang="en-US" smtClean="0"/>
-              <a:t>2022-01-24</a:t>
+              <a:t>2022-01-25</a:t>
             </a:fld>
             <a:endParaRPr lang="zh-CN" altLang="en-US"/>
           </a:p>
@@ -2668,7 +2668,7 @@
           <a:p>
             <a:fld id="{BD674694-9742-45AE-917A-66E650B458D2}" type="datetimeFigureOut">
               <a:rPr lang="zh-CN" altLang="en-US" smtClean="0"/>
-              <a:t>2022-01-24</a:t>
+              <a:t>2022-01-25</a:t>
             </a:fld>
             <a:endParaRPr lang="zh-CN" altLang="en-US"/>
           </a:p>
@@ -2909,7 +2909,7 @@
           <a:p>
             <a:fld id="{BD674694-9742-45AE-917A-66E650B458D2}" type="datetimeFigureOut">
               <a:rPr lang="zh-CN" altLang="en-US" smtClean="0"/>
-              <a:t>2022-01-24</a:t>
+              <a:t>2022-01-25</a:t>
             </a:fld>
             <a:endParaRPr lang="zh-CN" altLang="en-US"/>
           </a:p>

</xml_diff>